<commit_message>
added rmse values to graphs
</commit_message>
<xml_diff>
--- a/Figures/Fitting Method Comparisons.pptx
+++ b/Figures/Fitting Method Comparisons.pptx
@@ -109,6 +109,11 @@
       </a:defRPr>
     </a:lvl9pPr>
   </p:defaultTextStyle>
+  <p:extLst>
+    <p:ext uri="{EFAFB233-063F-42B5-8137-9DF3F51BA10A}">
+      <p15:sldGuideLst xmlns:p15="http://schemas.microsoft.com/office/powerpoint/2012/main"/>
+    </p:ext>
+  </p:extLst>
 </p:presentation>
 </file>
 
@@ -194,7 +199,7 @@
           <a:p>
             <a:fld id="{B42393CD-9798-48E7-9B4F-82D9DDF4DCE5}" type="datetimeFigureOut">
               <a:rPr lang="en-US" smtClean="0"/>
-              <a:t>1/13/2023</a:t>
+              <a:t>1/20/2023</a:t>
             </a:fld>
             <a:endParaRPr lang="en-US"/>
           </a:p>
@@ -804,7 +809,7 @@
           <a:p>
             <a:fld id="{1B7FC53F-5D81-402B-A212-365A162268AA}" type="datetimeFigureOut">
               <a:rPr lang="en-US" smtClean="0"/>
-              <a:t>1/13/2023</a:t>
+              <a:t>1/20/2023</a:t>
             </a:fld>
             <a:endParaRPr lang="en-US"/>
           </a:p>
@@ -1002,7 +1007,7 @@
           <a:p>
             <a:fld id="{1B7FC53F-5D81-402B-A212-365A162268AA}" type="datetimeFigureOut">
               <a:rPr lang="en-US" smtClean="0"/>
-              <a:t>1/13/2023</a:t>
+              <a:t>1/20/2023</a:t>
             </a:fld>
             <a:endParaRPr lang="en-US"/>
           </a:p>
@@ -1210,7 +1215,7 @@
           <a:p>
             <a:fld id="{1B7FC53F-5D81-402B-A212-365A162268AA}" type="datetimeFigureOut">
               <a:rPr lang="en-US" smtClean="0"/>
-              <a:t>1/13/2023</a:t>
+              <a:t>1/20/2023</a:t>
             </a:fld>
             <a:endParaRPr lang="en-US"/>
           </a:p>
@@ -1408,7 +1413,7 @@
           <a:p>
             <a:fld id="{1B7FC53F-5D81-402B-A212-365A162268AA}" type="datetimeFigureOut">
               <a:rPr lang="en-US" smtClean="0"/>
-              <a:t>1/13/2023</a:t>
+              <a:t>1/20/2023</a:t>
             </a:fld>
             <a:endParaRPr lang="en-US"/>
           </a:p>
@@ -1683,7 +1688,7 @@
           <a:p>
             <a:fld id="{1B7FC53F-5D81-402B-A212-365A162268AA}" type="datetimeFigureOut">
               <a:rPr lang="en-US" smtClean="0"/>
-              <a:t>1/13/2023</a:t>
+              <a:t>1/20/2023</a:t>
             </a:fld>
             <a:endParaRPr lang="en-US"/>
           </a:p>
@@ -1948,7 +1953,7 @@
           <a:p>
             <a:fld id="{1B7FC53F-5D81-402B-A212-365A162268AA}" type="datetimeFigureOut">
               <a:rPr lang="en-US" smtClean="0"/>
-              <a:t>1/13/2023</a:t>
+              <a:t>1/20/2023</a:t>
             </a:fld>
             <a:endParaRPr lang="en-US"/>
           </a:p>
@@ -2360,7 +2365,7 @@
           <a:p>
             <a:fld id="{1B7FC53F-5D81-402B-A212-365A162268AA}" type="datetimeFigureOut">
               <a:rPr lang="en-US" smtClean="0"/>
-              <a:t>1/13/2023</a:t>
+              <a:t>1/20/2023</a:t>
             </a:fld>
             <a:endParaRPr lang="en-US"/>
           </a:p>
@@ -2501,7 +2506,7 @@
           <a:p>
             <a:fld id="{1B7FC53F-5D81-402B-A212-365A162268AA}" type="datetimeFigureOut">
               <a:rPr lang="en-US" smtClean="0"/>
-              <a:t>1/13/2023</a:t>
+              <a:t>1/20/2023</a:t>
             </a:fld>
             <a:endParaRPr lang="en-US"/>
           </a:p>
@@ -2614,7 +2619,7 @@
           <a:p>
             <a:fld id="{1B7FC53F-5D81-402B-A212-365A162268AA}" type="datetimeFigureOut">
               <a:rPr lang="en-US" smtClean="0"/>
-              <a:t>1/13/2023</a:t>
+              <a:t>1/20/2023</a:t>
             </a:fld>
             <a:endParaRPr lang="en-US"/>
           </a:p>
@@ -2925,7 +2930,7 @@
           <a:p>
             <a:fld id="{1B7FC53F-5D81-402B-A212-365A162268AA}" type="datetimeFigureOut">
               <a:rPr lang="en-US" smtClean="0"/>
-              <a:t>1/13/2023</a:t>
+              <a:t>1/20/2023</a:t>
             </a:fld>
             <a:endParaRPr lang="en-US"/>
           </a:p>
@@ -3213,7 +3218,7 @@
           <a:p>
             <a:fld id="{1B7FC53F-5D81-402B-A212-365A162268AA}" type="datetimeFigureOut">
               <a:rPr lang="en-US" smtClean="0"/>
-              <a:t>1/13/2023</a:t>
+              <a:t>1/20/2023</a:t>
             </a:fld>
             <a:endParaRPr lang="en-US"/>
           </a:p>
@@ -3454,7 +3459,7 @@
           <a:p>
             <a:fld id="{1B7FC53F-5D81-402B-A212-365A162268AA}" type="datetimeFigureOut">
               <a:rPr lang="en-US" smtClean="0"/>
-              <a:t>1/13/2023</a:t>
+              <a:t>1/20/2023</a:t>
             </a:fld>
             <a:endParaRPr lang="en-US"/>
           </a:p>
@@ -3905,12 +3910,96 @@
           </a:p>
         </p:txBody>
       </p:sp>
+      <p:sp>
+        <p:nvSpPr>
+          <p:cNvPr id="8" name="TextBox 7">
+            <a:extLst>
+              <a:ext uri="{FF2B5EF4-FFF2-40B4-BE49-F238E27FC236}">
+                <a16:creationId xmlns:a16="http://schemas.microsoft.com/office/drawing/2014/main" id="{92DE6528-E0B9-AB93-7E4D-53EE43424787}"/>
+              </a:ext>
+            </a:extLst>
+          </p:cNvPr>
+          <p:cNvSpPr txBox="1"/>
+          <p:nvPr/>
+        </p:nvSpPr>
+        <p:spPr>
+          <a:xfrm>
+            <a:off x="251181" y="5444878"/>
+            <a:ext cx="1580322" cy="1200329"/>
+          </a:xfrm>
+          <a:prstGeom prst="rect">
+            <a:avLst/>
+          </a:prstGeom>
+          <a:noFill/>
+        </p:spPr>
+        <p:txBody>
+          <a:bodyPr wrap="square" rtlCol="0">
+            <a:spAutoFit/>
+          </a:bodyPr>
+          <a:lstStyle/>
+          <a:p>
+            <a:r>
+              <a:rPr lang="en-US" dirty="0" err="1"/>
+              <a:t>Plantecophys</a:t>
+            </a:r>
+            <a:r>
+              <a:rPr lang="en-US" dirty="0"/>
+              <a:t> did not fit K6702L1 for some reason</a:t>
+            </a:r>
+          </a:p>
+        </p:txBody>
+      </p:sp>
+      <p:sp>
+        <p:nvSpPr>
+          <p:cNvPr id="4" name="AutoShape 4">
+            <a:extLst>
+              <a:ext uri="{FF2B5EF4-FFF2-40B4-BE49-F238E27FC236}">
+                <a16:creationId xmlns:a16="http://schemas.microsoft.com/office/drawing/2014/main" id="{A19AB197-ACA3-72D9-9698-20978D184115}"/>
+              </a:ext>
+            </a:extLst>
+          </p:cNvPr>
+          <p:cNvSpPr>
+            <a:spLocks noChangeAspect="1" noChangeArrowheads="1"/>
+          </p:cNvSpPr>
+          <p:nvPr/>
+        </p:nvSpPr>
+        <p:spPr bwMode="auto">
+          <a:xfrm>
+            <a:off x="5943600" y="3276600"/>
+            <a:ext cx="304800" cy="304800"/>
+          </a:xfrm>
+          <a:prstGeom prst="rect">
+            <a:avLst/>
+          </a:prstGeom>
+          <a:noFill/>
+          <a:extLst>
+            <a:ext uri="{909E8E84-426E-40DD-AFC4-6F175D3DCCD1}">
+              <a14:hiddenFill xmlns:a14="http://schemas.microsoft.com/office/drawing/2010/main">
+                <a:solidFill>
+                  <a:srgbClr val="FFFFFF"/>
+                </a:solidFill>
+              </a14:hiddenFill>
+            </a:ext>
+          </a:extLst>
+        </p:spPr>
+        <p:txBody>
+          <a:bodyPr vert="horz" wrap="square" lIns="91440" tIns="45720" rIns="91440" bIns="45720" numCol="1" anchor="t" anchorCtr="0" compatLnSpc="1">
+            <a:prstTxWarp prst="textNoShape">
+              <a:avLst/>
+            </a:prstTxWarp>
+          </a:bodyPr>
+          <a:lstStyle/>
+          <a:p>
+            <a:endParaRPr lang="en-US"/>
+          </a:p>
+        </p:txBody>
+      </p:sp>
       <p:pic>
         <p:nvPicPr>
-          <p:cNvPr id="5" name="Picture 4">
-            <a:extLst>
-              <a:ext uri="{FF2B5EF4-FFF2-40B4-BE49-F238E27FC236}">
-                <a16:creationId xmlns:a16="http://schemas.microsoft.com/office/drawing/2014/main" id="{C34537F8-2859-BBCA-4588-6A51F6EDCD15}"/>
+          <p:cNvPr id="10" name="Picture 9">
+            <a:extLst>
+              <a:ext uri="{FF2B5EF4-FFF2-40B4-BE49-F238E27FC236}">
+                <a16:creationId xmlns:a16="http://schemas.microsoft.com/office/drawing/2014/main" id="{9FF38326-07D7-845C-570D-7C0E8123067C}"/>
               </a:ext>
             </a:extLst>
           </p:cNvPr>
@@ -3927,8 +4016,8 @@
         </p:blipFill>
         <p:spPr>
           <a:xfrm>
-            <a:off x="231303" y="212793"/>
-            <a:ext cx="4907952" cy="3110946"/>
+            <a:off x="3128547" y="3465913"/>
+            <a:ext cx="6075088" cy="3348779"/>
           </a:xfrm>
           <a:prstGeom prst="rect">
             <a:avLst/>
@@ -3937,10 +4026,10 @@
       </p:pic>
       <p:pic>
         <p:nvPicPr>
-          <p:cNvPr id="6" name="Picture 5">
-            <a:extLst>
-              <a:ext uri="{FF2B5EF4-FFF2-40B4-BE49-F238E27FC236}">
-                <a16:creationId xmlns:a16="http://schemas.microsoft.com/office/drawing/2014/main" id="{A1504448-FD49-192F-1378-1E7D3926B348}"/>
+          <p:cNvPr id="11" name="Picture 10">
+            <a:extLst>
+              <a:ext uri="{FF2B5EF4-FFF2-40B4-BE49-F238E27FC236}">
+                <a16:creationId xmlns:a16="http://schemas.microsoft.com/office/drawing/2014/main" id="{EB9ED016-C6BC-8F01-F513-716C4E7758E5}"/>
               </a:ext>
             </a:extLst>
           </p:cNvPr>
@@ -3957,8 +4046,8 @@
         </p:blipFill>
         <p:spPr>
           <a:xfrm>
-            <a:off x="2971800" y="3481145"/>
-            <a:ext cx="5327461" cy="3376855"/>
+            <a:off x="6850601" y="43308"/>
+            <a:ext cx="5341400" cy="3385691"/>
           </a:xfrm>
           <a:prstGeom prst="rect">
             <a:avLst/>
@@ -3967,10 +4056,10 @@
       </p:pic>
       <p:pic>
         <p:nvPicPr>
-          <p:cNvPr id="7" name="Picture 6">
-            <a:extLst>
-              <a:ext uri="{FF2B5EF4-FFF2-40B4-BE49-F238E27FC236}">
-                <a16:creationId xmlns:a16="http://schemas.microsoft.com/office/drawing/2014/main" id="{C3EF9A76-C386-0E19-6452-AC1F57771AF3}"/>
+          <p:cNvPr id="5" name="Picture 4">
+            <a:extLst>
+              <a:ext uri="{FF2B5EF4-FFF2-40B4-BE49-F238E27FC236}">
+                <a16:creationId xmlns:a16="http://schemas.microsoft.com/office/drawing/2014/main" id="{775F09DD-F409-8473-537C-B0DEDF2FB689}"/>
               </a:ext>
             </a:extLst>
           </p:cNvPr>
@@ -3987,53 +4076,14 @@
         </p:blipFill>
         <p:spPr>
           <a:xfrm>
-            <a:off x="7066317" y="212793"/>
-            <a:ext cx="5074016" cy="3216207"/>
+            <a:off x="27328" y="18235"/>
+            <a:ext cx="5439193" cy="3447678"/>
           </a:xfrm>
           <a:prstGeom prst="rect">
             <a:avLst/>
           </a:prstGeom>
         </p:spPr>
       </p:pic>
-      <p:sp>
-        <p:nvSpPr>
-          <p:cNvPr id="8" name="TextBox 7">
-            <a:extLst>
-              <a:ext uri="{FF2B5EF4-FFF2-40B4-BE49-F238E27FC236}">
-                <a16:creationId xmlns:a16="http://schemas.microsoft.com/office/drawing/2014/main" id="{92DE6528-E0B9-AB93-7E4D-53EE43424787}"/>
-              </a:ext>
-            </a:extLst>
-          </p:cNvPr>
-          <p:cNvSpPr txBox="1"/>
-          <p:nvPr/>
-        </p:nvSpPr>
-        <p:spPr>
-          <a:xfrm>
-            <a:off x="251181" y="5444878"/>
-            <a:ext cx="1580322" cy="1200329"/>
-          </a:xfrm>
-          <a:prstGeom prst="rect">
-            <a:avLst/>
-          </a:prstGeom>
-          <a:noFill/>
-        </p:spPr>
-        <p:txBody>
-          <a:bodyPr wrap="square" rtlCol="0">
-            <a:spAutoFit/>
-          </a:bodyPr>
-          <a:lstStyle/>
-          <a:p>
-            <a:r>
-              <a:rPr lang="en-US" dirty="0" err="1"/>
-              <a:t>Plantecophys</a:t>
-            </a:r>
-            <a:r>
-              <a:rPr lang="en-US" dirty="0"/>
-              <a:t> did not fit K6702L1 for some reason</a:t>
-            </a:r>
-          </a:p>
-        </p:txBody>
-      </p:sp>
     </p:spTree>
     <p:extLst>
       <p:ext uri="{BB962C8B-B14F-4D97-AF65-F5344CB8AC3E}">
@@ -4102,10 +4152,10 @@
       </p:sp>
       <p:pic>
         <p:nvPicPr>
-          <p:cNvPr id="4" name="Picture 3">
-            <a:extLst>
-              <a:ext uri="{FF2B5EF4-FFF2-40B4-BE49-F238E27FC236}">
-                <a16:creationId xmlns:a16="http://schemas.microsoft.com/office/drawing/2014/main" id="{40F72A5C-5333-CBCD-1AC1-02C28CDBDD7F}"/>
+          <p:cNvPr id="3" name="Picture 2">
+            <a:extLst>
+              <a:ext uri="{FF2B5EF4-FFF2-40B4-BE49-F238E27FC236}">
+                <a16:creationId xmlns:a16="http://schemas.microsoft.com/office/drawing/2014/main" id="{C81C5B6E-9C1F-EE70-A06C-46568827CC64}"/>
               </a:ext>
             </a:extLst>
           </p:cNvPr>
@@ -4122,7 +4172,7 @@
         </p:blipFill>
         <p:spPr>
           <a:xfrm>
-            <a:off x="3657600" y="3344452"/>
+            <a:off x="6850129" y="0"/>
             <a:ext cx="5341871" cy="3385989"/>
           </a:xfrm>
           <a:prstGeom prst="rect">
@@ -4132,10 +4182,10 @@
       </p:pic>
       <p:pic>
         <p:nvPicPr>
-          <p:cNvPr id="5" name="Picture 4">
-            <a:extLst>
-              <a:ext uri="{FF2B5EF4-FFF2-40B4-BE49-F238E27FC236}">
-                <a16:creationId xmlns:a16="http://schemas.microsoft.com/office/drawing/2014/main" id="{16EC6788-D9AF-8B73-63B9-A53FA1C10104}"/>
+          <p:cNvPr id="6" name="Picture 5">
+            <a:extLst>
+              <a:ext uri="{FF2B5EF4-FFF2-40B4-BE49-F238E27FC236}">
+                <a16:creationId xmlns:a16="http://schemas.microsoft.com/office/drawing/2014/main" id="{0FA82B48-E1EA-5E9B-91BE-AA701AFBACDA}"/>
               </a:ext>
             </a:extLst>
           </p:cNvPr>
@@ -4152,8 +4202,8 @@
         </p:blipFill>
         <p:spPr>
           <a:xfrm>
-            <a:off x="310181" y="127558"/>
-            <a:ext cx="5075098" cy="3216893"/>
+            <a:off x="3269976" y="3307053"/>
+            <a:ext cx="5602115" cy="3550947"/>
           </a:xfrm>
           <a:prstGeom prst="rect">
             <a:avLst/>
@@ -4162,10 +4212,10 @@
       </p:pic>
       <p:pic>
         <p:nvPicPr>
-          <p:cNvPr id="6" name="Picture 5">
-            <a:extLst>
-              <a:ext uri="{FF2B5EF4-FFF2-40B4-BE49-F238E27FC236}">
-                <a16:creationId xmlns:a16="http://schemas.microsoft.com/office/drawing/2014/main" id="{4D78D5DF-0E89-5DDA-202C-601236E3B842}"/>
+          <p:cNvPr id="8" name="Picture 7">
+            <a:extLst>
+              <a:ext uri="{FF2B5EF4-FFF2-40B4-BE49-F238E27FC236}">
+                <a16:creationId xmlns:a16="http://schemas.microsoft.com/office/drawing/2014/main" id="{473B8E48-6535-ADEA-5C23-6B1E95D221C6}"/>
               </a:ext>
             </a:extLst>
           </p:cNvPr>
@@ -4182,8 +4232,8 @@
         </p:blipFill>
         <p:spPr>
           <a:xfrm>
-            <a:off x="7108546" y="127558"/>
-            <a:ext cx="4937680" cy="3129790"/>
+            <a:off x="1" y="1"/>
+            <a:ext cx="5138530" cy="3257100"/>
           </a:xfrm>
           <a:prstGeom prst="rect">
             <a:avLst/>
@@ -4255,12 +4305,47 @@
           </a:p>
         </p:txBody>
       </p:sp>
+      <p:sp>
+        <p:nvSpPr>
+          <p:cNvPr id="7" name="TextBox 6">
+            <a:extLst>
+              <a:ext uri="{FF2B5EF4-FFF2-40B4-BE49-F238E27FC236}">
+                <a16:creationId xmlns:a16="http://schemas.microsoft.com/office/drawing/2014/main" id="{6B1B0AE7-F5F2-5264-E6CB-2384B8A876F4}"/>
+              </a:ext>
+            </a:extLst>
+          </p:cNvPr>
+          <p:cNvSpPr txBox="1"/>
+          <p:nvPr/>
+        </p:nvSpPr>
+        <p:spPr>
+          <a:xfrm>
+            <a:off x="407504" y="4472608"/>
+            <a:ext cx="1868557" cy="1477328"/>
+          </a:xfrm>
+          <a:prstGeom prst="rect">
+            <a:avLst/>
+          </a:prstGeom>
+          <a:noFill/>
+        </p:spPr>
+        <p:txBody>
+          <a:bodyPr wrap="square" rtlCol="0">
+            <a:spAutoFit/>
+          </a:bodyPr>
+          <a:lstStyle/>
+          <a:p>
+            <a:r>
+              <a:rPr lang="en-US" dirty="0"/>
+              <a:t>They did not all fit TPU for the same curves, or the same number of curves</a:t>
+            </a:r>
+          </a:p>
+        </p:txBody>
+      </p:sp>
       <p:pic>
         <p:nvPicPr>
-          <p:cNvPr id="4" name="Picture 3">
-            <a:extLst>
-              <a:ext uri="{FF2B5EF4-FFF2-40B4-BE49-F238E27FC236}">
-                <a16:creationId xmlns:a16="http://schemas.microsoft.com/office/drawing/2014/main" id="{0EF0079F-3FEB-CEB0-DD9B-E5288B3B021A}"/>
+          <p:cNvPr id="8" name="Picture 7">
+            <a:extLst>
+              <a:ext uri="{FF2B5EF4-FFF2-40B4-BE49-F238E27FC236}">
+                <a16:creationId xmlns:a16="http://schemas.microsoft.com/office/drawing/2014/main" id="{BB4FE2B8-3F93-BA41-6F43-A117BC5CC320}"/>
               </a:ext>
             </a:extLst>
           </p:cNvPr>
@@ -4277,8 +4362,8 @@
         </p:blipFill>
         <p:spPr>
           <a:xfrm>
-            <a:off x="3033502" y="3254081"/>
-            <a:ext cx="5547164" cy="3516116"/>
+            <a:off x="3361493" y="3392352"/>
+            <a:ext cx="5404819" cy="3425889"/>
           </a:xfrm>
           <a:prstGeom prst="rect">
             <a:avLst/>
@@ -4287,10 +4372,10 @@
       </p:pic>
       <p:pic>
         <p:nvPicPr>
-          <p:cNvPr id="5" name="Picture 4">
-            <a:extLst>
-              <a:ext uri="{FF2B5EF4-FFF2-40B4-BE49-F238E27FC236}">
-                <a16:creationId xmlns:a16="http://schemas.microsoft.com/office/drawing/2014/main" id="{94FE5C95-42BF-E601-71D9-FB779B17FC53}"/>
+          <p:cNvPr id="9" name="Picture 8">
+            <a:extLst>
+              <a:ext uri="{FF2B5EF4-FFF2-40B4-BE49-F238E27FC236}">
+                <a16:creationId xmlns:a16="http://schemas.microsoft.com/office/drawing/2014/main" id="{A7005850-C38C-25E5-5A16-DF816822282B}"/>
               </a:ext>
             </a:extLst>
           </p:cNvPr>
@@ -4307,8 +4392,8 @@
         </p:blipFill>
         <p:spPr>
           <a:xfrm>
-            <a:off x="200850" y="87802"/>
-            <a:ext cx="5271204" cy="3341197"/>
+            <a:off x="120091" y="39759"/>
+            <a:ext cx="5404820" cy="3425890"/>
           </a:xfrm>
           <a:prstGeom prst="rect">
             <a:avLst/>
@@ -4317,10 +4402,10 @@
       </p:pic>
       <p:pic>
         <p:nvPicPr>
-          <p:cNvPr id="6" name="Picture 5">
-            <a:extLst>
-              <a:ext uri="{FF2B5EF4-FFF2-40B4-BE49-F238E27FC236}">
-                <a16:creationId xmlns:a16="http://schemas.microsoft.com/office/drawing/2014/main" id="{9EF3D41C-0C86-3FC7-5B96-DC98A5537E63}"/>
+          <p:cNvPr id="11" name="Picture 10">
+            <a:extLst>
+              <a:ext uri="{FF2B5EF4-FFF2-40B4-BE49-F238E27FC236}">
+                <a16:creationId xmlns:a16="http://schemas.microsoft.com/office/drawing/2014/main" id="{44886C87-6605-C558-AE2D-11EE1656F782}"/>
               </a:ext>
             </a:extLst>
           </p:cNvPr>
@@ -4337,49 +4422,14 @@
         </p:blipFill>
         <p:spPr>
           <a:xfrm>
-            <a:off x="7076661" y="87802"/>
-            <a:ext cx="4995248" cy="3166279"/>
+            <a:off x="6907696" y="0"/>
+            <a:ext cx="5284304" cy="3349500"/>
           </a:xfrm>
           <a:prstGeom prst="rect">
             <a:avLst/>
           </a:prstGeom>
         </p:spPr>
       </p:pic>
-      <p:sp>
-        <p:nvSpPr>
-          <p:cNvPr id="7" name="TextBox 6">
-            <a:extLst>
-              <a:ext uri="{FF2B5EF4-FFF2-40B4-BE49-F238E27FC236}">
-                <a16:creationId xmlns:a16="http://schemas.microsoft.com/office/drawing/2014/main" id="{6B1B0AE7-F5F2-5264-E6CB-2384B8A876F4}"/>
-              </a:ext>
-            </a:extLst>
-          </p:cNvPr>
-          <p:cNvSpPr txBox="1"/>
-          <p:nvPr/>
-        </p:nvSpPr>
-        <p:spPr>
-          <a:xfrm>
-            <a:off x="407504" y="4472608"/>
-            <a:ext cx="1868557" cy="1477328"/>
-          </a:xfrm>
-          <a:prstGeom prst="rect">
-            <a:avLst/>
-          </a:prstGeom>
-          <a:noFill/>
-        </p:spPr>
-        <p:txBody>
-          <a:bodyPr wrap="square" rtlCol="0">
-            <a:spAutoFit/>
-          </a:bodyPr>
-          <a:lstStyle/>
-          <a:p>
-            <a:r>
-              <a:rPr lang="en-US" dirty="0"/>
-              <a:t>They did not all fit TPU for the same curves, or the same number of curves</a:t>
-            </a:r>
-          </a:p>
-        </p:txBody>
-      </p:sp>
     </p:spTree>
     <p:extLst>
       <p:ext uri="{BB962C8B-B14F-4D97-AF65-F5344CB8AC3E}">

</xml_diff>